<commit_message>
Refactor and edit diagram
</commit_message>
<xml_diff>
--- a/docs/diagrams/StorageComponentClassDiagram.pptx
+++ b/docs/diagrams/StorageComponentClassDiagram.pptx
@@ -126,6 +126,259 @@
 </p:presentation>
 </file>
 
+<file path=ppt/revisionInfo.xml><?xml version="1.0" encoding="utf-8"?>
+<p1510:revInfo xmlns:a="http://schemas.openxmlformats.org/drawingml/2006/main" xmlns:r="http://schemas.openxmlformats.org/officeDocument/2006/relationships" xmlns:p1510="http://schemas.microsoft.com/office/powerpoint/2015/10/main">
+  <p1510:revLst>
+    <p1510:client id="{677FC9F6-6F8F-4220-BE48-22FF2C298C41}" v="19" dt="2018-11-13T11:40:31.355"/>
+  </p1510:revLst>
+</p1510:revInfo>
+</file>
+
+<file path=ppt/changesInfos/changesInfo1.xml><?xml version="1.0" encoding="utf-8"?>
+<pc:chgInfo xmlns:a="http://schemas.openxmlformats.org/drawingml/2006/main" xmlns:r="http://schemas.openxmlformats.org/officeDocument/2006/relationships" xmlns:ac="http://schemas.microsoft.com/office/drawing/2013/main/command" xmlns:pc="http://schemas.microsoft.com/office/powerpoint/2013/main/command">
+  <pc:docChgLst>
+    <pc:chgData name="Jefferson Sie" userId="5781d7962b165b47" providerId="LiveId" clId="{677FC9F6-6F8F-4220-BE48-22FF2C298C41}"/>
+    <pc:docChg chg="undo custSel modSld">
+      <pc:chgData name="Jefferson Sie" userId="5781d7962b165b47" providerId="LiveId" clId="{677FC9F6-6F8F-4220-BE48-22FF2C298C41}" dt="2018-11-13T11:40:51.368" v="324" actId="1076"/>
+      <pc:docMkLst>
+        <pc:docMk/>
+      </pc:docMkLst>
+      <pc:sldChg chg="addSp delSp modSp">
+        <pc:chgData name="Jefferson Sie" userId="5781d7962b165b47" providerId="LiveId" clId="{677FC9F6-6F8F-4220-BE48-22FF2C298C41}" dt="2018-11-13T11:40:51.368" v="324" actId="1076"/>
+        <pc:sldMkLst>
+          <pc:docMk/>
+          <pc:sldMk cId="1478832369" sldId="264"/>
+        </pc:sldMkLst>
+        <pc:spChg chg="mod">
+          <ac:chgData name="Jefferson Sie" userId="5781d7962b165b47" providerId="LiveId" clId="{677FC9F6-6F8F-4220-BE48-22FF2C298C41}" dt="2018-11-13T11:17:11.870" v="10" actId="20577"/>
+          <ac:spMkLst>
+            <pc:docMk/>
+            <pc:sldMk cId="1478832369" sldId="264"/>
+            <ac:spMk id="2" creationId="{00000000-0000-0000-0000-000000000000}"/>
+          </ac:spMkLst>
+        </pc:spChg>
+        <pc:spChg chg="mod">
+          <ac:chgData name="Jefferson Sie" userId="5781d7962b165b47" providerId="LiveId" clId="{677FC9F6-6F8F-4220-BE48-22FF2C298C41}" dt="2018-11-13T11:22:12.625" v="56" actId="1076"/>
+          <ac:spMkLst>
+            <pc:docMk/>
+            <pc:sldMk cId="1478832369" sldId="264"/>
+            <ac:spMk id="26" creationId="{8A2F6E3A-27C6-447D-B267-808BA94FA103}"/>
+          </ac:spMkLst>
+        </pc:spChg>
+        <pc:spChg chg="mod">
+          <ac:chgData name="Jefferson Sie" userId="5781d7962b165b47" providerId="LiveId" clId="{677FC9F6-6F8F-4220-BE48-22FF2C298C41}" dt="2018-11-13T11:25:57.990" v="116" actId="1076"/>
+          <ac:spMkLst>
+            <pc:docMk/>
+            <pc:sldMk cId="1478832369" sldId="264"/>
+            <ac:spMk id="33" creationId="{9571D654-1174-4CFF-BAC5-FC9CC84354E1}"/>
+          </ac:spMkLst>
+        </pc:spChg>
+        <pc:spChg chg="add mod">
+          <ac:chgData name="Jefferson Sie" userId="5781d7962b165b47" providerId="LiveId" clId="{677FC9F6-6F8F-4220-BE48-22FF2C298C41}" dt="2018-11-13T11:22:58.612" v="71" actId="20577"/>
+          <ac:spMkLst>
+            <pc:docMk/>
+            <pc:sldMk cId="1478832369" sldId="264"/>
+            <ac:spMk id="45" creationId="{C26A9634-33A9-42C8-99AB-99A4B0F37EBF}"/>
+          </ac:spMkLst>
+        </pc:spChg>
+        <pc:spChg chg="add mod">
+          <ac:chgData name="Jefferson Sie" userId="5781d7962b165b47" providerId="LiveId" clId="{677FC9F6-6F8F-4220-BE48-22FF2C298C41}" dt="2018-11-13T11:23:57.788" v="98" actId="20577"/>
+          <ac:spMkLst>
+            <pc:docMk/>
+            <pc:sldMk cId="1478832369" sldId="264"/>
+            <ac:spMk id="47" creationId="{2903A2ED-26C9-4483-835D-45349F6F784B}"/>
+          </ac:spMkLst>
+        </pc:spChg>
+        <pc:spChg chg="mod">
+          <ac:chgData name="Jefferson Sie" userId="5781d7962b165b47" providerId="LiveId" clId="{677FC9F6-6F8F-4220-BE48-22FF2C298C41}" dt="2018-11-13T11:17:24.111" v="31" actId="20577"/>
+          <ac:spMkLst>
+            <pc:docMk/>
+            <pc:sldMk cId="1478832369" sldId="264"/>
+            <ac:spMk id="50" creationId="{00000000-0000-0000-0000-000000000000}"/>
+          </ac:spMkLst>
+        </pc:spChg>
+        <pc:spChg chg="add mod">
+          <ac:chgData name="Jefferson Sie" userId="5781d7962b165b47" providerId="LiveId" clId="{677FC9F6-6F8F-4220-BE48-22FF2C298C41}" dt="2018-11-13T11:35:39.535" v="226" actId="1076"/>
+          <ac:spMkLst>
+            <pc:docMk/>
+            <pc:sldMk cId="1478832369" sldId="264"/>
+            <ac:spMk id="62" creationId="{4F59183B-3470-44A6-B479-79FBBE2886CB}"/>
+          </ac:spMkLst>
+        </pc:spChg>
+        <pc:spChg chg="mod">
+          <ac:chgData name="Jefferson Sie" userId="5781d7962b165b47" providerId="LiveId" clId="{677FC9F6-6F8F-4220-BE48-22FF2C298C41}" dt="2018-11-13T11:17:38.843" v="54" actId="20577"/>
+          <ac:spMkLst>
+            <pc:docMk/>
+            <pc:sldMk cId="1478832369" sldId="264"/>
+            <ac:spMk id="66" creationId="{00000000-0000-0000-0000-000000000000}"/>
+          </ac:spMkLst>
+        </pc:spChg>
+        <pc:spChg chg="mod">
+          <ac:chgData name="Jefferson Sie" userId="5781d7962b165b47" providerId="LiveId" clId="{677FC9F6-6F8F-4220-BE48-22FF2C298C41}" dt="2018-11-13T11:18:14.565" v="55" actId="1076"/>
+          <ac:spMkLst>
+            <pc:docMk/>
+            <pc:sldMk cId="1478832369" sldId="264"/>
+            <ac:spMk id="73" creationId="{00000000-0000-0000-0000-000000000000}"/>
+          </ac:spMkLst>
+        </pc:spChg>
+        <pc:spChg chg="add mod">
+          <ac:chgData name="Jefferson Sie" userId="5781d7962b165b47" providerId="LiveId" clId="{677FC9F6-6F8F-4220-BE48-22FF2C298C41}" dt="2018-11-13T11:37:51.917" v="262" actId="20577"/>
+          <ac:spMkLst>
+            <pc:docMk/>
+            <pc:sldMk cId="1478832369" sldId="264"/>
+            <ac:spMk id="117" creationId="{C8851E84-3FD4-4210-B3CF-1BC77A039A8F}"/>
+          </ac:spMkLst>
+        </pc:spChg>
+        <pc:spChg chg="mod">
+          <ac:chgData name="Jefferson Sie" userId="5781d7962b165b47" providerId="LiveId" clId="{677FC9F6-6F8F-4220-BE48-22FF2C298C41}" dt="2018-11-13T11:40:39.469" v="322" actId="1076"/>
+          <ac:spMkLst>
+            <pc:docMk/>
+            <pc:sldMk cId="1478832369" sldId="264"/>
+            <ac:spMk id="118" creationId="{00000000-0000-0000-0000-000000000000}"/>
+          </ac:spMkLst>
+        </pc:spChg>
+        <pc:spChg chg="add mod">
+          <ac:chgData name="Jefferson Sie" userId="5781d7962b165b47" providerId="LiveId" clId="{677FC9F6-6F8F-4220-BE48-22FF2C298C41}" dt="2018-11-13T11:39:18.096" v="289" actId="1076"/>
+          <ac:spMkLst>
+            <pc:docMk/>
+            <pc:sldMk cId="1478832369" sldId="264"/>
+            <ac:spMk id="125" creationId="{29E3E344-6023-4C6E-AB1D-646BEFF6E2CB}"/>
+          </ac:spMkLst>
+        </pc:spChg>
+        <pc:spChg chg="add mod">
+          <ac:chgData name="Jefferson Sie" userId="5781d7962b165b47" providerId="LiveId" clId="{677FC9F6-6F8F-4220-BE48-22FF2C298C41}" dt="2018-11-13T11:40:51.368" v="324" actId="1076"/>
+          <ac:spMkLst>
+            <pc:docMk/>
+            <pc:sldMk cId="1478832369" sldId="264"/>
+            <ac:spMk id="131" creationId="{42F2AEF6-B3E8-4560-BFFE-E85BE26D08A9}"/>
+          </ac:spMkLst>
+        </pc:spChg>
+        <pc:cxnChg chg="mod">
+          <ac:chgData name="Jefferson Sie" userId="5781d7962b165b47" providerId="LiveId" clId="{677FC9F6-6F8F-4220-BE48-22FF2C298C41}" dt="2018-11-13T11:22:12.625" v="56" actId="1076"/>
+          <ac:cxnSpMkLst>
+            <pc:docMk/>
+            <pc:sldMk cId="1478832369" sldId="264"/>
+            <ac:cxnSpMk id="27" creationId="{2B47BBF8-2B21-405A-BC5A-2B621787160E}"/>
+          </ac:cxnSpMkLst>
+        </pc:cxnChg>
+        <pc:cxnChg chg="mod">
+          <ac:chgData name="Jefferson Sie" userId="5781d7962b165b47" providerId="LiveId" clId="{677FC9F6-6F8F-4220-BE48-22FF2C298C41}" dt="2018-11-13T11:26:08.396" v="118" actId="14100"/>
+          <ac:cxnSpMkLst>
+            <pc:docMk/>
+            <pc:sldMk cId="1478832369" sldId="264"/>
+            <ac:cxnSpMk id="36" creationId="{69D86792-8C00-4E35-8A0D-9731F655F908}"/>
+          </ac:cxnSpMkLst>
+        </pc:cxnChg>
+        <pc:cxnChg chg="add mod">
+          <ac:chgData name="Jefferson Sie" userId="5781d7962b165b47" providerId="LiveId" clId="{677FC9F6-6F8F-4220-BE48-22FF2C298C41}" dt="2018-11-13T11:23:39.893" v="78" actId="1076"/>
+          <ac:cxnSpMkLst>
+            <pc:docMk/>
+            <pc:sldMk cId="1478832369" sldId="264"/>
+            <ac:cxnSpMk id="46" creationId="{6E201A31-D073-458D-A97E-ABE10A9E9293}"/>
+          </ac:cxnSpMkLst>
+        </pc:cxnChg>
+        <pc:cxnChg chg="add mod">
+          <ac:chgData name="Jefferson Sie" userId="5781d7962b165b47" providerId="LiveId" clId="{677FC9F6-6F8F-4220-BE48-22FF2C298C41}" dt="2018-11-13T11:25:13.027" v="108" actId="14100"/>
+          <ac:cxnSpMkLst>
+            <pc:docMk/>
+            <pc:sldMk cId="1478832369" sldId="264"/>
+            <ac:cxnSpMk id="48" creationId="{F25D56B0-9122-4D6C-80E9-E16DC3B84F8B}"/>
+          </ac:cxnSpMkLst>
+        </pc:cxnChg>
+        <pc:cxnChg chg="add del mod">
+          <ac:chgData name="Jefferson Sie" userId="5781d7962b165b47" providerId="LiveId" clId="{677FC9F6-6F8F-4220-BE48-22FF2C298C41}" dt="2018-11-13T11:32:15.981" v="196" actId="478"/>
+          <ac:cxnSpMkLst>
+            <pc:docMk/>
+            <pc:sldMk cId="1478832369" sldId="264"/>
+            <ac:cxnSpMk id="55" creationId="{A5E54C6D-3A64-4461-BD1C-A4D03D288B14}"/>
+          </ac:cxnSpMkLst>
+        </pc:cxnChg>
+        <pc:cxnChg chg="mod">
+          <ac:chgData name="Jefferson Sie" userId="5781d7962b165b47" providerId="LiveId" clId="{677FC9F6-6F8F-4220-BE48-22FF2C298C41}" dt="2018-11-13T11:22:25.546" v="58" actId="14100"/>
+          <ac:cxnSpMkLst>
+            <pc:docMk/>
+            <pc:sldMk cId="1478832369" sldId="264"/>
+            <ac:cxnSpMk id="70" creationId="{00000000-0000-0000-0000-000000000000}"/>
+          </ac:cxnSpMkLst>
+        </pc:cxnChg>
+        <pc:cxnChg chg="add del mod">
+          <ac:chgData name="Jefferson Sie" userId="5781d7962b165b47" providerId="LiveId" clId="{677FC9F6-6F8F-4220-BE48-22FF2C298C41}" dt="2018-11-13T11:32:51.719" v="205" actId="478"/>
+          <ac:cxnSpMkLst>
+            <pc:docMk/>
+            <pc:sldMk cId="1478832369" sldId="264"/>
+            <ac:cxnSpMk id="91" creationId="{1D817008-9A51-47EB-A4D5-A3C51FB75BB9}"/>
+          </ac:cxnSpMkLst>
+        </pc:cxnChg>
+        <pc:cxnChg chg="add del mod">
+          <ac:chgData name="Jefferson Sie" userId="5781d7962b165b47" providerId="LiveId" clId="{677FC9F6-6F8F-4220-BE48-22FF2C298C41}" dt="2018-11-13T11:33:06.745" v="209" actId="478"/>
+          <ac:cxnSpMkLst>
+            <pc:docMk/>
+            <pc:sldMk cId="1478832369" sldId="264"/>
+            <ac:cxnSpMk id="96" creationId="{022529BB-C49E-4A29-B127-6DE20DE0819A}"/>
+          </ac:cxnSpMkLst>
+        </pc:cxnChg>
+        <pc:cxnChg chg="add del mod">
+          <ac:chgData name="Jefferson Sie" userId="5781d7962b165b47" providerId="LiveId" clId="{677FC9F6-6F8F-4220-BE48-22FF2C298C41}" dt="2018-11-13T11:34:58.727" v="223" actId="478"/>
+          <ac:cxnSpMkLst>
+            <pc:docMk/>
+            <pc:sldMk cId="1478832369" sldId="264"/>
+            <ac:cxnSpMk id="98" creationId="{7930C394-5685-47FA-9B2B-22284A1E439C}"/>
+          </ac:cxnSpMkLst>
+        </pc:cxnChg>
+        <pc:cxnChg chg="add del mod">
+          <ac:chgData name="Jefferson Sie" userId="5781d7962b165b47" providerId="LiveId" clId="{677FC9F6-6F8F-4220-BE48-22FF2C298C41}" dt="2018-11-13T11:34:06.974" v="219"/>
+          <ac:cxnSpMkLst>
+            <pc:docMk/>
+            <pc:sldMk cId="1478832369" sldId="264"/>
+            <ac:cxnSpMk id="100" creationId="{119F37A8-89F6-48AF-88A0-4FFD3C59032C}"/>
+          </ac:cxnSpMkLst>
+        </pc:cxnChg>
+        <pc:cxnChg chg="add del mod">
+          <ac:chgData name="Jefferson Sie" userId="5781d7962b165b47" providerId="LiveId" clId="{677FC9F6-6F8F-4220-BE48-22FF2C298C41}" dt="2018-11-13T11:35:47.377" v="228" actId="478"/>
+          <ac:cxnSpMkLst>
+            <pc:docMk/>
+            <pc:sldMk cId="1478832369" sldId="264"/>
+            <ac:cxnSpMk id="103" creationId="{B45CAC20-B1A1-4B28-BCFE-C5EBE677A87A}"/>
+          </ac:cxnSpMkLst>
+        </pc:cxnChg>
+        <pc:cxnChg chg="add mod">
+          <ac:chgData name="Jefferson Sie" userId="5781d7962b165b47" providerId="LiveId" clId="{677FC9F6-6F8F-4220-BE48-22FF2C298C41}" dt="2018-11-13T11:38:36.036" v="265" actId="14100"/>
+          <ac:cxnSpMkLst>
+            <pc:docMk/>
+            <pc:sldMk cId="1478832369" sldId="264"/>
+            <ac:cxnSpMk id="107" creationId="{60170E59-727D-4119-9306-5A61D8C50ADD}"/>
+          </ac:cxnSpMkLst>
+        </pc:cxnChg>
+        <pc:cxnChg chg="add mod">
+          <ac:chgData name="Jefferson Sie" userId="5781d7962b165b47" providerId="LiveId" clId="{677FC9F6-6F8F-4220-BE48-22FF2C298C41}" dt="2018-11-13T11:37:44.529" v="246" actId="1076"/>
+          <ac:cxnSpMkLst>
+            <pc:docMk/>
+            <pc:sldMk cId="1478832369" sldId="264"/>
+            <ac:cxnSpMk id="121" creationId="{8FB8ADBD-629D-41BB-ABF3-46B3BFA8B0EF}"/>
+          </ac:cxnSpMkLst>
+        </pc:cxnChg>
+        <pc:cxnChg chg="add mod">
+          <ac:chgData name="Jefferson Sie" userId="5781d7962b165b47" providerId="LiveId" clId="{677FC9F6-6F8F-4220-BE48-22FF2C298C41}" dt="2018-11-13T11:39:58.994" v="295" actId="14100"/>
+          <ac:cxnSpMkLst>
+            <pc:docMk/>
+            <pc:sldMk cId="1478832369" sldId="264"/>
+            <ac:cxnSpMk id="126" creationId="{FC7FFE2D-D338-42BD-AAB2-5CA6437CF93F}"/>
+          </ac:cxnSpMkLst>
+        </pc:cxnChg>
+        <pc:cxnChg chg="add mod">
+          <ac:chgData name="Jefferson Sie" userId="5781d7962b165b47" providerId="LiveId" clId="{677FC9F6-6F8F-4220-BE48-22FF2C298C41}" dt="2018-11-13T11:40:48.568" v="323" actId="1076"/>
+          <ac:cxnSpMkLst>
+            <pc:docMk/>
+            <pc:sldMk cId="1478832369" sldId="264"/>
+            <ac:cxnSpMk id="132" creationId="{0C71F60E-54DB-441D-A95A-F0A68CE6850E}"/>
+          </ac:cxnSpMkLst>
+        </pc:cxnChg>
+      </pc:sldChg>
+    </pc:docChg>
+  </pc:docChgLst>
+</pc:chgInfo>
+</file>
+
 <file path=ppt/notesMasters/notesMaster1.xml><?xml version="1.0" encoding="utf-8"?>
 <p:notesMaster xmlns:a="http://schemas.openxmlformats.org/drawingml/2006/main" xmlns:r="http://schemas.openxmlformats.org/officeDocument/2006/relationships" xmlns:p="http://schemas.openxmlformats.org/presentationml/2006/main">
   <p:cSld>
@@ -208,7 +461,7 @@
           <a:p>
             <a:fld id="{F5CC4B3F-88C1-4FFA-B1B6-F41C21DC6924}" type="datetimeFigureOut">
               <a:rPr lang="en-US" smtClean="0"/>
-              <a:t>21-Oct-18</a:t>
+              <a:t>11/13/2018</a:t>
             </a:fld>
             <a:endParaRPr lang="en-US"/>
           </a:p>
@@ -654,7 +907,7 @@
           <a:p>
             <a:fld id="{78C97017-6FC3-485B-9764-EAC9E56C1D49}" type="datetimeFigureOut">
               <a:rPr lang="en-US" smtClean="0"/>
-              <a:t>21-Oct-18</a:t>
+              <a:t>11/13/2018</a:t>
             </a:fld>
             <a:endParaRPr lang="en-US"/>
           </a:p>
@@ -822,7 +1075,7 @@
           <a:p>
             <a:fld id="{78C97017-6FC3-485B-9764-EAC9E56C1D49}" type="datetimeFigureOut">
               <a:rPr lang="en-US" smtClean="0"/>
-              <a:t>21-Oct-18</a:t>
+              <a:t>11/13/2018</a:t>
             </a:fld>
             <a:endParaRPr lang="en-US"/>
           </a:p>
@@ -1000,7 +1253,7 @@
           <a:p>
             <a:fld id="{78C97017-6FC3-485B-9764-EAC9E56C1D49}" type="datetimeFigureOut">
               <a:rPr lang="en-US" smtClean="0"/>
-              <a:t>21-Oct-18</a:t>
+              <a:t>11/13/2018</a:t>
             </a:fld>
             <a:endParaRPr lang="en-US"/>
           </a:p>
@@ -1168,7 +1421,7 @@
           <a:p>
             <a:fld id="{78C97017-6FC3-485B-9764-EAC9E56C1D49}" type="datetimeFigureOut">
               <a:rPr lang="en-US" smtClean="0"/>
-              <a:t>21-Oct-18</a:t>
+              <a:t>11/13/2018</a:t>
             </a:fld>
             <a:endParaRPr lang="en-US"/>
           </a:p>
@@ -1413,7 +1666,7 @@
           <a:p>
             <a:fld id="{78C97017-6FC3-485B-9764-EAC9E56C1D49}" type="datetimeFigureOut">
               <a:rPr lang="en-US" smtClean="0"/>
-              <a:t>21-Oct-18</a:t>
+              <a:t>11/13/2018</a:t>
             </a:fld>
             <a:endParaRPr lang="en-US"/>
           </a:p>
@@ -1698,7 +1951,7 @@
           <a:p>
             <a:fld id="{78C97017-6FC3-485B-9764-EAC9E56C1D49}" type="datetimeFigureOut">
               <a:rPr lang="en-US" smtClean="0"/>
-              <a:t>21-Oct-18</a:t>
+              <a:t>11/13/2018</a:t>
             </a:fld>
             <a:endParaRPr lang="en-US"/>
           </a:p>
@@ -2117,7 +2370,7 @@
           <a:p>
             <a:fld id="{78C97017-6FC3-485B-9764-EAC9E56C1D49}" type="datetimeFigureOut">
               <a:rPr lang="en-US" smtClean="0"/>
-              <a:t>21-Oct-18</a:t>
+              <a:t>11/13/2018</a:t>
             </a:fld>
             <a:endParaRPr lang="en-US"/>
           </a:p>
@@ -2234,7 +2487,7 @@
           <a:p>
             <a:fld id="{78C97017-6FC3-485B-9764-EAC9E56C1D49}" type="datetimeFigureOut">
               <a:rPr lang="en-US" smtClean="0"/>
-              <a:t>21-Oct-18</a:t>
+              <a:t>11/13/2018</a:t>
             </a:fld>
             <a:endParaRPr lang="en-US"/>
           </a:p>
@@ -2329,7 +2582,7 @@
           <a:p>
             <a:fld id="{78C97017-6FC3-485B-9764-EAC9E56C1D49}" type="datetimeFigureOut">
               <a:rPr lang="en-US" smtClean="0"/>
-              <a:t>21-Oct-18</a:t>
+              <a:t>11/13/2018</a:t>
             </a:fld>
             <a:endParaRPr lang="en-US"/>
           </a:p>
@@ -2604,7 +2857,7 @@
           <a:p>
             <a:fld id="{78C97017-6FC3-485B-9764-EAC9E56C1D49}" type="datetimeFigureOut">
               <a:rPr lang="en-US" smtClean="0"/>
-              <a:t>21-Oct-18</a:t>
+              <a:t>11/13/2018</a:t>
             </a:fld>
             <a:endParaRPr lang="en-US"/>
           </a:p>
@@ -2856,7 +3109,7 @@
           <a:p>
             <a:fld id="{78C97017-6FC3-485B-9764-EAC9E56C1D49}" type="datetimeFigureOut">
               <a:rPr lang="en-US" smtClean="0"/>
-              <a:t>21-Oct-18</a:t>
+              <a:t>11/13/2018</a:t>
             </a:fld>
             <a:endParaRPr lang="en-US"/>
           </a:p>
@@ -3067,7 +3320,7 @@
           <a:p>
             <a:fld id="{78C97017-6FC3-485B-9764-EAC9E56C1D49}" type="datetimeFigureOut">
               <a:rPr lang="en-US" smtClean="0"/>
-              <a:t>21-Oct-18</a:t>
+              <a:t>11/13/2018</a:t>
             </a:fld>
             <a:endParaRPr lang="en-US"/>
           </a:p>
@@ -3575,7 +3828,7 @@
                   <a:schemeClr val="bg1"/>
                 </a:solidFill>
               </a:rPr>
-              <a:t>AddressBookStorage</a:t>
+              <a:t>HealthBaseStorage</a:t>
             </a:r>
             <a:endParaRPr lang="en-SG" sz="1050" dirty="0">
               <a:solidFill>
@@ -4148,7 +4401,7 @@
                   </a:schemeClr>
                 </a:solidFill>
               </a:rPr>
-              <a:t>XmlAddressBook</a:t>
+              <a:t>XmlHealthBase</a:t>
             </a:r>
             <a:br>
               <a:rPr lang="en-US" sz="1050" b="1" dirty="0">
@@ -4593,7 +4846,7 @@
                   </a:schemeClr>
                 </a:solidFill>
               </a:rPr>
-              <a:t>AddressBook</a:t>
+              <a:t>HealthBase</a:t>
             </a:r>
             <a:endParaRPr lang="en-SG" sz="1050" b="1" dirty="0">
               <a:solidFill>
@@ -4609,15 +4862,16 @@
         <p:nvCxnSpPr>
           <p:cNvPr id="70" name="Elbow Connector 122"/>
           <p:cNvCxnSpPr>
+            <a:cxnSpLocks/>
             <a:stCxn id="74" idx="0"/>
             <a:endCxn id="73" idx="2"/>
           </p:cNvCxnSpPr>
           <p:nvPr/>
         </p:nvCxnSpPr>
         <p:spPr>
-          <a:xfrm rot="5400000" flipH="1" flipV="1">
-            <a:off x="7110529" y="2734438"/>
-            <a:ext cx="335208" cy="12700"/>
+          <a:xfrm rot="16200000" flipV="1">
+            <a:off x="6320605" y="1944513"/>
+            <a:ext cx="260108" cy="1654949"/>
           </a:xfrm>
           <a:prstGeom prst="bentConnector3">
             <a:avLst>
@@ -4654,7 +4908,7 @@
         </p:nvSpPr>
         <p:spPr>
           <a:xfrm>
-            <a:off x="6648274" y="2220074"/>
+            <a:off x="4993325" y="2295174"/>
             <a:ext cx="1259718" cy="346760"/>
           </a:xfrm>
           <a:prstGeom prst="rect">
@@ -4813,7 +5067,7 @@
         </p:nvSpPr>
         <p:spPr>
           <a:xfrm>
-            <a:off x="6641924" y="3577660"/>
+            <a:off x="6651846" y="3577660"/>
             <a:ext cx="1259718" cy="346760"/>
           </a:xfrm>
           <a:prstGeom prst="rect">
@@ -4898,9 +5152,9 @@
           <p:nvPr/>
         </p:nvCxnSpPr>
         <p:spPr>
-          <a:xfrm rot="5400000">
-            <a:off x="7110529" y="3410056"/>
-            <a:ext cx="328858" cy="6350"/>
+          <a:xfrm rot="16200000" flipH="1">
+            <a:off x="7115490" y="3411445"/>
+            <a:ext cx="328858" cy="3572"/>
           </a:xfrm>
           <a:prstGeom prst="bentConnector3">
             <a:avLst>
@@ -5071,7 +5325,7 @@
         </p:nvSpPr>
         <p:spPr>
           <a:xfrm>
-            <a:off x="4993325" y="4288618"/>
+            <a:off x="8294813" y="4288618"/>
             <a:ext cx="1259718" cy="346760"/>
           </a:xfrm>
           <a:prstGeom prst="rect">
@@ -5278,15 +5532,15 @@
           </p:cNvPr>
           <p:cNvCxnSpPr>
             <a:cxnSpLocks/>
-            <a:stCxn id="30" idx="1"/>
-            <a:endCxn id="33" idx="3"/>
+            <a:stCxn id="30" idx="3"/>
+            <a:endCxn id="33" idx="1"/>
           </p:cNvCxnSpPr>
           <p:nvPr/>
         </p:nvCxnSpPr>
         <p:spPr>
-          <a:xfrm rot="10800000" flipV="1">
-            <a:off x="6253044" y="4461170"/>
-            <a:ext cx="385071" cy="828"/>
+          <a:xfrm>
+            <a:off x="7897832" y="4461170"/>
+            <a:ext cx="396981" cy="828"/>
           </a:xfrm>
           <a:prstGeom prst="bentConnector3">
             <a:avLst>
@@ -5534,6 +5788,769 @@
           <a:xfrm rot="5400000">
             <a:off x="8757068" y="3429112"/>
             <a:ext cx="328858" cy="6350"/>
+          </a:xfrm>
+          <a:prstGeom prst="bentConnector3">
+            <a:avLst>
+              <a:gd name="adj1" fmla="val 50000"/>
+            </a:avLst>
+          </a:prstGeom>
+          <a:ln w="19050">
+            <a:prstDash val="sysDot"/>
+            <a:headEnd type="none" w="med" len="med"/>
+            <a:tailEnd type="arrow" w="med" len="med"/>
+          </a:ln>
+          <a:effectLst/>
+        </p:spPr>
+        <p:style>
+          <a:lnRef idx="1">
+            <a:schemeClr val="accent6"/>
+          </a:lnRef>
+          <a:fillRef idx="2">
+            <a:schemeClr val="accent6"/>
+          </a:fillRef>
+          <a:effectRef idx="1">
+            <a:schemeClr val="accent6"/>
+          </a:effectRef>
+          <a:fontRef idx="minor">
+            <a:schemeClr val="dk1"/>
+          </a:fontRef>
+        </p:style>
+      </p:cxnSp>
+      <p:sp>
+        <p:nvSpPr>
+          <p:cNvPr id="45" name="Rectangle 8">
+            <a:extLst>
+              <a:ext uri="{FF2B5EF4-FFF2-40B4-BE49-F238E27FC236}">
+                <a16:creationId xmlns:a16="http://schemas.microsoft.com/office/drawing/2014/main" id="{C26A9634-33A9-42C8-99AB-99A4B0F37EBF}"/>
+              </a:ext>
+            </a:extLst>
+          </p:cNvPr>
+          <p:cNvSpPr/>
+          <p:nvPr/>
+        </p:nvSpPr>
+        <p:spPr>
+          <a:xfrm>
+            <a:off x="6651846" y="2284269"/>
+            <a:ext cx="1259718" cy="346760"/>
+          </a:xfrm>
+          <a:prstGeom prst="rect">
+            <a:avLst/>
+          </a:prstGeom>
+          <a:ln w="19050"/>
+          <a:effectLst/>
+        </p:spPr>
+        <p:style>
+          <a:lnRef idx="1">
+            <a:schemeClr val="accent6"/>
+          </a:lnRef>
+          <a:fillRef idx="2">
+            <a:schemeClr val="accent6"/>
+          </a:fillRef>
+          <a:effectRef idx="1">
+            <a:schemeClr val="accent6"/>
+          </a:effectRef>
+          <a:fontRef idx="minor">
+            <a:schemeClr val="dk1"/>
+          </a:fontRef>
+        </p:style>
+        <p:txBody>
+          <a:bodyPr rtlCol="0" anchor="ctr"/>
+          <a:lstStyle/>
+          <a:p>
+            <a:pPr algn="ctr"/>
+            <a:r>
+              <a:rPr lang="en-US" sz="1050" b="1" dirty="0" err="1">
+                <a:solidFill>
+                  <a:schemeClr val="accent6">
+                    <a:lumMod val="75000"/>
+                  </a:schemeClr>
+                </a:solidFill>
+              </a:rPr>
+              <a:t>XmlAdapted</a:t>
+            </a:r>
+            <a:endParaRPr lang="en-US" sz="1050" b="1" dirty="0">
+              <a:solidFill>
+                <a:schemeClr val="accent6">
+                  <a:lumMod val="75000"/>
+                </a:schemeClr>
+              </a:solidFill>
+            </a:endParaRPr>
+          </a:p>
+          <a:p>
+            <a:pPr algn="ctr"/>
+            <a:r>
+              <a:rPr lang="en-US" sz="1050" b="1" dirty="0" err="1">
+                <a:solidFill>
+                  <a:schemeClr val="accent6">
+                    <a:lumMod val="75000"/>
+                  </a:schemeClr>
+                </a:solidFill>
+              </a:rPr>
+              <a:t>VisitorList</a:t>
+            </a:r>
+            <a:endParaRPr lang="en-SG" sz="1050" b="1" dirty="0">
+              <a:solidFill>
+                <a:schemeClr val="accent6">
+                  <a:lumMod val="75000"/>
+                </a:schemeClr>
+              </a:solidFill>
+            </a:endParaRPr>
+          </a:p>
+        </p:txBody>
+      </p:sp>
+      <p:cxnSp>
+        <p:nvCxnSpPr>
+          <p:cNvPr id="46" name="Elbow Connector 122">
+            <a:extLst>
+              <a:ext uri="{FF2B5EF4-FFF2-40B4-BE49-F238E27FC236}">
+                <a16:creationId xmlns:a16="http://schemas.microsoft.com/office/drawing/2014/main" id="{6E201A31-D073-458D-A97E-ABE10A9E9293}"/>
+              </a:ext>
+            </a:extLst>
+          </p:cNvPr>
+          <p:cNvCxnSpPr>
+            <a:cxnSpLocks/>
+          </p:cNvCxnSpPr>
+          <p:nvPr/>
+        </p:nvCxnSpPr>
+        <p:spPr>
+          <a:xfrm flipV="1">
+            <a:off x="7914243" y="2455657"/>
+            <a:ext cx="367095" cy="1722"/>
+          </a:xfrm>
+          <a:prstGeom prst="bentConnector3">
+            <a:avLst>
+              <a:gd name="adj1" fmla="val 50000"/>
+            </a:avLst>
+          </a:prstGeom>
+          <a:ln w="19050">
+            <a:prstDash val="sysDot"/>
+            <a:headEnd type="none" w="med" len="med"/>
+            <a:tailEnd type="arrow" w="med" len="med"/>
+          </a:ln>
+          <a:effectLst/>
+        </p:spPr>
+        <p:style>
+          <a:lnRef idx="1">
+            <a:schemeClr val="accent6"/>
+          </a:lnRef>
+          <a:fillRef idx="2">
+            <a:schemeClr val="accent6"/>
+          </a:fillRef>
+          <a:effectRef idx="1">
+            <a:schemeClr val="accent6"/>
+          </a:effectRef>
+          <a:fontRef idx="minor">
+            <a:schemeClr val="dk1"/>
+          </a:fontRef>
+        </p:style>
+      </p:cxnSp>
+      <p:sp>
+        <p:nvSpPr>
+          <p:cNvPr id="47" name="Rectangle 8">
+            <a:extLst>
+              <a:ext uri="{FF2B5EF4-FFF2-40B4-BE49-F238E27FC236}">
+                <a16:creationId xmlns:a16="http://schemas.microsoft.com/office/drawing/2014/main" id="{2903A2ED-26C9-4483-835D-45349F6F784B}"/>
+              </a:ext>
+            </a:extLst>
+          </p:cNvPr>
+          <p:cNvSpPr/>
+          <p:nvPr/>
+        </p:nvSpPr>
+        <p:spPr>
+          <a:xfrm>
+            <a:off x="8300927" y="2279382"/>
+            <a:ext cx="1259718" cy="346760"/>
+          </a:xfrm>
+          <a:prstGeom prst="rect">
+            <a:avLst/>
+          </a:prstGeom>
+          <a:ln w="19050"/>
+          <a:effectLst/>
+        </p:spPr>
+        <p:style>
+          <a:lnRef idx="1">
+            <a:schemeClr val="accent6"/>
+          </a:lnRef>
+          <a:fillRef idx="2">
+            <a:schemeClr val="accent6"/>
+          </a:fillRef>
+          <a:effectRef idx="1">
+            <a:schemeClr val="accent6"/>
+          </a:effectRef>
+          <a:fontRef idx="minor">
+            <a:schemeClr val="dk1"/>
+          </a:fontRef>
+        </p:style>
+        <p:txBody>
+          <a:bodyPr rtlCol="0" anchor="ctr"/>
+          <a:lstStyle/>
+          <a:p>
+            <a:pPr algn="ctr"/>
+            <a:r>
+              <a:rPr lang="en-US" sz="1050" b="1" dirty="0" err="1">
+                <a:solidFill>
+                  <a:schemeClr val="accent6">
+                    <a:lumMod val="75000"/>
+                  </a:schemeClr>
+                </a:solidFill>
+              </a:rPr>
+              <a:t>XmlAdapted</a:t>
+            </a:r>
+            <a:endParaRPr lang="en-US" sz="1050" b="1" dirty="0">
+              <a:solidFill>
+                <a:schemeClr val="accent6">
+                  <a:lumMod val="75000"/>
+                </a:schemeClr>
+              </a:solidFill>
+            </a:endParaRPr>
+          </a:p>
+          <a:p>
+            <a:pPr algn="ctr"/>
+            <a:r>
+              <a:rPr lang="en-SG" sz="1050" b="1" dirty="0">
+                <a:solidFill>
+                  <a:schemeClr val="accent6">
+                    <a:lumMod val="75000"/>
+                  </a:schemeClr>
+                </a:solidFill>
+              </a:rPr>
+              <a:t>Visitor</a:t>
+            </a:r>
+          </a:p>
+        </p:txBody>
+      </p:sp>
+      <p:cxnSp>
+        <p:nvCxnSpPr>
+          <p:cNvPr id="48" name="Elbow Connector 122">
+            <a:extLst>
+              <a:ext uri="{FF2B5EF4-FFF2-40B4-BE49-F238E27FC236}">
+                <a16:creationId xmlns:a16="http://schemas.microsoft.com/office/drawing/2014/main" id="{F25D56B0-9122-4D6C-80E9-E16DC3B84F8B}"/>
+              </a:ext>
+            </a:extLst>
+          </p:cNvPr>
+          <p:cNvCxnSpPr>
+            <a:cxnSpLocks/>
+          </p:cNvCxnSpPr>
+          <p:nvPr/>
+        </p:nvCxnSpPr>
+        <p:spPr>
+          <a:xfrm rot="5400000" flipH="1" flipV="1">
+            <a:off x="7319604" y="2757400"/>
+            <a:ext cx="264996" cy="2481"/>
+          </a:xfrm>
+          <a:prstGeom prst="bentConnector3">
+            <a:avLst>
+              <a:gd name="adj1" fmla="val 50000"/>
+            </a:avLst>
+          </a:prstGeom>
+          <a:ln w="19050">
+            <a:prstDash val="sysDot"/>
+            <a:headEnd type="none" w="med" len="med"/>
+            <a:tailEnd type="arrow" w="med" len="med"/>
+          </a:ln>
+          <a:effectLst/>
+        </p:spPr>
+        <p:style>
+          <a:lnRef idx="1">
+            <a:schemeClr val="accent6"/>
+          </a:lnRef>
+          <a:fillRef idx="2">
+            <a:schemeClr val="accent6"/>
+          </a:fillRef>
+          <a:effectRef idx="1">
+            <a:schemeClr val="accent6"/>
+          </a:effectRef>
+          <a:fontRef idx="minor">
+            <a:schemeClr val="dk1"/>
+          </a:fontRef>
+        </p:style>
+      </p:cxnSp>
+      <p:sp>
+        <p:nvSpPr>
+          <p:cNvPr id="62" name="Rectangle 8">
+            <a:extLst>
+              <a:ext uri="{FF2B5EF4-FFF2-40B4-BE49-F238E27FC236}">
+                <a16:creationId xmlns:a16="http://schemas.microsoft.com/office/drawing/2014/main" id="{4F59183B-3470-44A6-B479-79FBBE2886CB}"/>
+              </a:ext>
+            </a:extLst>
+          </p:cNvPr>
+          <p:cNvSpPr/>
+          <p:nvPr/>
+        </p:nvSpPr>
+        <p:spPr>
+          <a:xfrm>
+            <a:off x="5190940" y="5014259"/>
+            <a:ext cx="1259718" cy="346760"/>
+          </a:xfrm>
+          <a:prstGeom prst="rect">
+            <a:avLst/>
+          </a:prstGeom>
+          <a:ln w="19050"/>
+          <a:effectLst/>
+        </p:spPr>
+        <p:style>
+          <a:lnRef idx="1">
+            <a:schemeClr val="accent6"/>
+          </a:lnRef>
+          <a:fillRef idx="2">
+            <a:schemeClr val="accent6"/>
+          </a:fillRef>
+          <a:effectRef idx="1">
+            <a:schemeClr val="accent6"/>
+          </a:effectRef>
+          <a:fontRef idx="minor">
+            <a:schemeClr val="dk1"/>
+          </a:fontRef>
+        </p:style>
+        <p:txBody>
+          <a:bodyPr rtlCol="0" anchor="ctr"/>
+          <a:lstStyle/>
+          <a:p>
+            <a:pPr algn="ctr"/>
+            <a:r>
+              <a:rPr lang="en-US" sz="1050" b="1" dirty="0" err="1">
+                <a:solidFill>
+                  <a:schemeClr val="accent6">
+                    <a:lumMod val="75000"/>
+                  </a:schemeClr>
+                </a:solidFill>
+              </a:rPr>
+              <a:t>XmlAdapted</a:t>
+            </a:r>
+            <a:endParaRPr lang="en-US" sz="1050" b="1" dirty="0">
+              <a:solidFill>
+                <a:schemeClr val="accent6">
+                  <a:lumMod val="75000"/>
+                </a:schemeClr>
+              </a:solidFill>
+            </a:endParaRPr>
+          </a:p>
+          <a:p>
+            <a:pPr algn="ctr"/>
+            <a:r>
+              <a:rPr lang="en-US" sz="1050" b="1" dirty="0" err="1">
+                <a:solidFill>
+                  <a:schemeClr val="accent6">
+                    <a:lumMod val="75000"/>
+                  </a:schemeClr>
+                </a:solidFill>
+              </a:rPr>
+              <a:t>DietCollection</a:t>
+            </a:r>
+            <a:endParaRPr lang="en-SG" sz="1050" b="1" dirty="0">
+              <a:solidFill>
+                <a:schemeClr val="accent6">
+                  <a:lumMod val="75000"/>
+                </a:schemeClr>
+              </a:solidFill>
+            </a:endParaRPr>
+          </a:p>
+        </p:txBody>
+      </p:sp>
+      <p:cxnSp>
+        <p:nvCxnSpPr>
+          <p:cNvPr id="107" name="Elbow Connector 122">
+            <a:extLst>
+              <a:ext uri="{FF2B5EF4-FFF2-40B4-BE49-F238E27FC236}">
+                <a16:creationId xmlns:a16="http://schemas.microsoft.com/office/drawing/2014/main" id="{60170E59-727D-4119-9306-5A61D8C50ADD}"/>
+              </a:ext>
+            </a:extLst>
+          </p:cNvPr>
+          <p:cNvCxnSpPr>
+            <a:cxnSpLocks/>
+          </p:cNvCxnSpPr>
+          <p:nvPr/>
+        </p:nvCxnSpPr>
+        <p:spPr>
+          <a:xfrm rot="5400000">
+            <a:off x="5650850" y="3999142"/>
+            <a:ext cx="1803983" cy="224683"/>
+          </a:xfrm>
+          <a:prstGeom prst="bentConnector3">
+            <a:avLst>
+              <a:gd name="adj1" fmla="val 2970"/>
+            </a:avLst>
+          </a:prstGeom>
+          <a:ln w="19050">
+            <a:prstDash val="sysDot"/>
+            <a:headEnd type="none" w="med" len="med"/>
+            <a:tailEnd type="arrow" w="med" len="med"/>
+          </a:ln>
+          <a:effectLst/>
+        </p:spPr>
+        <p:style>
+          <a:lnRef idx="1">
+            <a:schemeClr val="accent6"/>
+          </a:lnRef>
+          <a:fillRef idx="2">
+            <a:schemeClr val="accent6"/>
+          </a:fillRef>
+          <a:effectRef idx="1">
+            <a:schemeClr val="accent6"/>
+          </a:effectRef>
+          <a:fontRef idx="minor">
+            <a:schemeClr val="dk1"/>
+          </a:fontRef>
+        </p:style>
+      </p:cxnSp>
+      <p:sp>
+        <p:nvSpPr>
+          <p:cNvPr id="117" name="Rectangle 8">
+            <a:extLst>
+              <a:ext uri="{FF2B5EF4-FFF2-40B4-BE49-F238E27FC236}">
+                <a16:creationId xmlns:a16="http://schemas.microsoft.com/office/drawing/2014/main" id="{C8851E84-3FD4-4210-B3CF-1BC77A039A8F}"/>
+              </a:ext>
+            </a:extLst>
+          </p:cNvPr>
+          <p:cNvSpPr/>
+          <p:nvPr/>
+        </p:nvSpPr>
+        <p:spPr>
+          <a:xfrm>
+            <a:off x="3567622" y="5014259"/>
+            <a:ext cx="1259718" cy="346760"/>
+          </a:xfrm>
+          <a:prstGeom prst="rect">
+            <a:avLst/>
+          </a:prstGeom>
+          <a:ln w="19050"/>
+          <a:effectLst/>
+        </p:spPr>
+        <p:style>
+          <a:lnRef idx="1">
+            <a:schemeClr val="accent6"/>
+          </a:lnRef>
+          <a:fillRef idx="2">
+            <a:schemeClr val="accent6"/>
+          </a:fillRef>
+          <a:effectRef idx="1">
+            <a:schemeClr val="accent6"/>
+          </a:effectRef>
+          <a:fontRef idx="minor">
+            <a:schemeClr val="dk1"/>
+          </a:fontRef>
+        </p:style>
+        <p:txBody>
+          <a:bodyPr rtlCol="0" anchor="ctr"/>
+          <a:lstStyle/>
+          <a:p>
+            <a:pPr algn="ctr"/>
+            <a:r>
+              <a:rPr lang="en-US" sz="1050" b="1" dirty="0" err="1">
+                <a:solidFill>
+                  <a:schemeClr val="accent6">
+                    <a:lumMod val="75000"/>
+                  </a:schemeClr>
+                </a:solidFill>
+              </a:rPr>
+              <a:t>XmlAdapted</a:t>
+            </a:r>
+            <a:endParaRPr lang="en-US" sz="1050" b="1" dirty="0">
+              <a:solidFill>
+                <a:schemeClr val="accent6">
+                  <a:lumMod val="75000"/>
+                </a:schemeClr>
+              </a:solidFill>
+            </a:endParaRPr>
+          </a:p>
+          <a:p>
+            <a:pPr algn="ctr"/>
+            <a:r>
+              <a:rPr lang="en-US" sz="1050" b="1" dirty="0">
+                <a:solidFill>
+                  <a:schemeClr val="accent6">
+                    <a:lumMod val="75000"/>
+                  </a:schemeClr>
+                </a:solidFill>
+              </a:rPr>
+              <a:t>Diet</a:t>
+            </a:r>
+            <a:endParaRPr lang="en-SG" sz="1050" b="1" dirty="0">
+              <a:solidFill>
+                <a:schemeClr val="accent6">
+                  <a:lumMod val="75000"/>
+                </a:schemeClr>
+              </a:solidFill>
+            </a:endParaRPr>
+          </a:p>
+        </p:txBody>
+      </p:sp>
+      <p:cxnSp>
+        <p:nvCxnSpPr>
+          <p:cNvPr id="121" name="Elbow Connector 122">
+            <a:extLst>
+              <a:ext uri="{FF2B5EF4-FFF2-40B4-BE49-F238E27FC236}">
+                <a16:creationId xmlns:a16="http://schemas.microsoft.com/office/drawing/2014/main" id="{8FB8ADBD-629D-41BB-ABF3-46B3BFA8B0EF}"/>
+              </a:ext>
+            </a:extLst>
+          </p:cNvPr>
+          <p:cNvCxnSpPr>
+            <a:cxnSpLocks/>
+            <a:stCxn id="62" idx="1"/>
+            <a:endCxn id="117" idx="3"/>
+          </p:cNvCxnSpPr>
+          <p:nvPr/>
+        </p:nvCxnSpPr>
+        <p:spPr>
+          <a:xfrm rot="10800000">
+            <a:off x="4827340" y="5187639"/>
+            <a:ext cx="363600" cy="12700"/>
+          </a:xfrm>
+          <a:prstGeom prst="bentConnector3">
+            <a:avLst>
+              <a:gd name="adj1" fmla="val 50000"/>
+            </a:avLst>
+          </a:prstGeom>
+          <a:ln w="19050">
+            <a:prstDash val="sysDot"/>
+            <a:headEnd type="none" w="med" len="med"/>
+            <a:tailEnd type="arrow" w="med" len="med"/>
+          </a:ln>
+          <a:effectLst/>
+        </p:spPr>
+        <p:style>
+          <a:lnRef idx="1">
+            <a:schemeClr val="accent6"/>
+          </a:lnRef>
+          <a:fillRef idx="2">
+            <a:schemeClr val="accent6"/>
+          </a:fillRef>
+          <a:effectRef idx="1">
+            <a:schemeClr val="accent6"/>
+          </a:effectRef>
+          <a:fontRef idx="minor">
+            <a:schemeClr val="dk1"/>
+          </a:fontRef>
+        </p:style>
+      </p:cxnSp>
+      <p:sp>
+        <p:nvSpPr>
+          <p:cNvPr id="125" name="Rectangle 8">
+            <a:extLst>
+              <a:ext uri="{FF2B5EF4-FFF2-40B4-BE49-F238E27FC236}">
+                <a16:creationId xmlns:a16="http://schemas.microsoft.com/office/drawing/2014/main" id="{29E3E344-6023-4C6E-AB1D-646BEFF6E2CB}"/>
+              </a:ext>
+            </a:extLst>
+          </p:cNvPr>
+          <p:cNvSpPr/>
+          <p:nvPr/>
+        </p:nvSpPr>
+        <p:spPr>
+          <a:xfrm>
+            <a:off x="5131814" y="4233225"/>
+            <a:ext cx="1259718" cy="346760"/>
+          </a:xfrm>
+          <a:prstGeom prst="rect">
+            <a:avLst/>
+          </a:prstGeom>
+          <a:ln w="19050"/>
+          <a:effectLst/>
+        </p:spPr>
+        <p:style>
+          <a:lnRef idx="1">
+            <a:schemeClr val="accent6"/>
+          </a:lnRef>
+          <a:fillRef idx="2">
+            <a:schemeClr val="accent6"/>
+          </a:fillRef>
+          <a:effectRef idx="1">
+            <a:schemeClr val="accent6"/>
+          </a:effectRef>
+          <a:fontRef idx="minor">
+            <a:schemeClr val="dk1"/>
+          </a:fontRef>
+        </p:style>
+        <p:txBody>
+          <a:bodyPr rtlCol="0" anchor="ctr"/>
+          <a:lstStyle/>
+          <a:p>
+            <a:pPr algn="ctr"/>
+            <a:r>
+              <a:rPr lang="en-US" sz="1050" b="1" dirty="0" err="1">
+                <a:solidFill>
+                  <a:schemeClr val="accent6">
+                    <a:lumMod val="75000"/>
+                  </a:schemeClr>
+                </a:solidFill>
+              </a:rPr>
+              <a:t>XmlAdapted</a:t>
+            </a:r>
+            <a:endParaRPr lang="en-US" sz="1050" b="1" dirty="0">
+              <a:solidFill>
+                <a:schemeClr val="accent6">
+                  <a:lumMod val="75000"/>
+                </a:schemeClr>
+              </a:solidFill>
+            </a:endParaRPr>
+          </a:p>
+          <a:p>
+            <a:pPr algn="ctr"/>
+            <a:r>
+              <a:rPr lang="en-US" sz="1050" b="1" dirty="0">
+                <a:solidFill>
+                  <a:schemeClr val="accent6">
+                    <a:lumMod val="75000"/>
+                  </a:schemeClr>
+                </a:solidFill>
+              </a:rPr>
+              <a:t>Diagnosis</a:t>
+            </a:r>
+            <a:endParaRPr lang="en-SG" sz="1050" b="1" dirty="0">
+              <a:solidFill>
+                <a:schemeClr val="accent6">
+                  <a:lumMod val="75000"/>
+                </a:schemeClr>
+              </a:solidFill>
+            </a:endParaRPr>
+          </a:p>
+        </p:txBody>
+      </p:sp>
+      <p:cxnSp>
+        <p:nvCxnSpPr>
+          <p:cNvPr id="126" name="Elbow Connector 122">
+            <a:extLst>
+              <a:ext uri="{FF2B5EF4-FFF2-40B4-BE49-F238E27FC236}">
+                <a16:creationId xmlns:a16="http://schemas.microsoft.com/office/drawing/2014/main" id="{FC7FFE2D-D338-42BD-AAB2-5CA6437CF93F}"/>
+              </a:ext>
+            </a:extLst>
+          </p:cNvPr>
+          <p:cNvCxnSpPr>
+            <a:cxnSpLocks/>
+          </p:cNvCxnSpPr>
+          <p:nvPr/>
+        </p:nvCxnSpPr>
+        <p:spPr>
+          <a:xfrm rot="5400000">
+            <a:off x="5965063" y="3546442"/>
+            <a:ext cx="1023733" cy="349834"/>
+          </a:xfrm>
+          <a:prstGeom prst="bentConnector3">
+            <a:avLst>
+              <a:gd name="adj1" fmla="val -3408"/>
+            </a:avLst>
+          </a:prstGeom>
+          <a:ln w="19050">
+            <a:prstDash val="sysDot"/>
+            <a:headEnd type="none" w="med" len="med"/>
+            <a:tailEnd type="arrow" w="med" len="med"/>
+          </a:ln>
+          <a:effectLst/>
+        </p:spPr>
+        <p:style>
+          <a:lnRef idx="1">
+            <a:schemeClr val="accent6"/>
+          </a:lnRef>
+          <a:fillRef idx="2">
+            <a:schemeClr val="accent6"/>
+          </a:fillRef>
+          <a:effectRef idx="1">
+            <a:schemeClr val="accent6"/>
+          </a:effectRef>
+          <a:fontRef idx="minor">
+            <a:schemeClr val="dk1"/>
+          </a:fontRef>
+        </p:style>
+      </p:cxnSp>
+      <p:sp>
+        <p:nvSpPr>
+          <p:cNvPr id="131" name="Rectangle 8">
+            <a:extLst>
+              <a:ext uri="{FF2B5EF4-FFF2-40B4-BE49-F238E27FC236}">
+                <a16:creationId xmlns:a16="http://schemas.microsoft.com/office/drawing/2014/main" id="{42F2AEF6-B3E8-4560-BFFE-E85BE26D08A9}"/>
+              </a:ext>
+            </a:extLst>
+          </p:cNvPr>
+          <p:cNvSpPr/>
+          <p:nvPr/>
+        </p:nvSpPr>
+        <p:spPr>
+          <a:xfrm>
+            <a:off x="3500122" y="4233225"/>
+            <a:ext cx="1259718" cy="346760"/>
+          </a:xfrm>
+          <a:prstGeom prst="rect">
+            <a:avLst/>
+          </a:prstGeom>
+          <a:ln w="19050"/>
+          <a:effectLst/>
+        </p:spPr>
+        <p:style>
+          <a:lnRef idx="1">
+            <a:schemeClr val="accent6"/>
+          </a:lnRef>
+          <a:fillRef idx="2">
+            <a:schemeClr val="accent6"/>
+          </a:fillRef>
+          <a:effectRef idx="1">
+            <a:schemeClr val="accent6"/>
+          </a:effectRef>
+          <a:fontRef idx="minor">
+            <a:schemeClr val="dk1"/>
+          </a:fontRef>
+        </p:style>
+        <p:txBody>
+          <a:bodyPr rtlCol="0" anchor="ctr"/>
+          <a:lstStyle/>
+          <a:p>
+            <a:pPr algn="ctr"/>
+            <a:r>
+              <a:rPr lang="en-US" sz="1050" b="1" dirty="0" err="1">
+                <a:solidFill>
+                  <a:schemeClr val="accent6">
+                    <a:lumMod val="75000"/>
+                  </a:schemeClr>
+                </a:solidFill>
+              </a:rPr>
+              <a:t>XmlAdapted</a:t>
+            </a:r>
+            <a:endParaRPr lang="en-US" sz="1050" b="1" dirty="0">
+              <a:solidFill>
+                <a:schemeClr val="accent6">
+                  <a:lumMod val="75000"/>
+                </a:schemeClr>
+              </a:solidFill>
+            </a:endParaRPr>
+          </a:p>
+          <a:p>
+            <a:pPr algn="ctr"/>
+            <a:r>
+              <a:rPr lang="en-US" sz="1050" b="1" dirty="0" err="1">
+                <a:solidFill>
+                  <a:schemeClr val="accent6">
+                    <a:lumMod val="75000"/>
+                  </a:schemeClr>
+                </a:solidFill>
+              </a:rPr>
+              <a:t>MedicalHistory</a:t>
+            </a:r>
+            <a:endParaRPr lang="en-SG" sz="1050" b="1" dirty="0">
+              <a:solidFill>
+                <a:schemeClr val="accent6">
+                  <a:lumMod val="75000"/>
+                </a:schemeClr>
+              </a:solidFill>
+            </a:endParaRPr>
+          </a:p>
+        </p:txBody>
+      </p:sp>
+      <p:cxnSp>
+        <p:nvCxnSpPr>
+          <p:cNvPr id="132" name="Elbow Connector 122">
+            <a:extLst>
+              <a:ext uri="{FF2B5EF4-FFF2-40B4-BE49-F238E27FC236}">
+                <a16:creationId xmlns:a16="http://schemas.microsoft.com/office/drawing/2014/main" id="{0C71F60E-54DB-441D-A95A-F0A68CE6850E}"/>
+              </a:ext>
+            </a:extLst>
+          </p:cNvPr>
+          <p:cNvCxnSpPr>
+            <a:cxnSpLocks/>
+          </p:cNvCxnSpPr>
+          <p:nvPr/>
+        </p:nvCxnSpPr>
+        <p:spPr>
+          <a:xfrm rot="10800000">
+            <a:off x="4752866" y="4406604"/>
+            <a:ext cx="363600" cy="12700"/>
           </a:xfrm>
           <a:prstGeom prst="bentConnector3">
             <a:avLst>

</xml_diff>